<commit_message>
:pencil2: Fix typo in the README
</commit_message>
<xml_diff>
--- a/doc/trankil_schema.pptx
+++ b/doc/trankil_schema.pptx
@@ -6,6 +6,7 @@
   </p:sldMasterIdLst>
   <p:sldIdLst>
     <p:sldId id="256" r:id="rId2"/>
+    <p:sldId id="257" r:id="rId3"/>
   </p:sldIdLst>
   <p:sldSz cx="12192000" cy="6858000"/>
   <p:notesSz cx="6858000" cy="9144000"/>
@@ -2973,7 +2974,7 @@
         <p:spPr>
           <a:xfrm>
             <a:off x="251992" y="124245"/>
-            <a:ext cx="8409408" cy="6090288"/>
+            <a:ext cx="8409408" cy="6843822"/>
           </a:xfrm>
           <a:prstGeom prst="roundRect">
             <a:avLst/>
@@ -3224,7 +3225,7 @@
         </p:blipFill>
         <p:spPr>
           <a:xfrm>
-            <a:off x="567967" y="2166671"/>
+            <a:off x="524364" y="2166671"/>
             <a:ext cx="640080" cy="640080"/>
           </a:xfrm>
           <a:prstGeom prst="rect">
@@ -3359,16 +3360,10 @@
             <a:p>
               <a:pPr algn="ctr"/>
               <a:r>
-                <a:rPr lang="fr-FR" sz="1200" b="1" dirty="0" err="1" smtClean="0">
-                  <a:latin typeface="Trebuchet MS" panose="020B0603020202020204" pitchFamily="34" charset="0"/>
-                </a:rPr>
-                <a:t>Trankil</a:t>
-              </a:r>
-              <a:r>
                 <a:rPr lang="fr-FR" sz="1200" b="1" dirty="0" smtClean="0">
                   <a:latin typeface="Trebuchet MS" panose="020B0603020202020204" pitchFamily="34" charset="0"/>
                 </a:rPr>
-                <a:t> application</a:t>
+                <a:t>Trankil application</a:t>
               </a:r>
               <a:endParaRPr lang="en-US" sz="1200" b="1" dirty="0">
                 <a:latin typeface="Trebuchet MS" panose="020B0603020202020204" pitchFamily="34" charset="0"/>
@@ -3420,7 +3415,7 @@
         </p:nvSpPr>
         <p:spPr>
           <a:xfrm>
-            <a:off x="613626" y="2841402"/>
+            <a:off x="570023" y="2841402"/>
             <a:ext cx="548761" cy="276999"/>
           </a:xfrm>
           <a:prstGeom prst="rect">
@@ -4370,17 +4365,17 @@
       </p:cxnSp>
       <p:cxnSp>
         <p:nvCxnSpPr>
-          <p:cNvPr id="95" name="Straight Arrow Connector 94"/>
+          <p:cNvPr id="96" name="Straight Arrow Connector 95"/>
           <p:cNvCxnSpPr>
             <a:stCxn id="19" idx="2"/>
-            <a:endCxn id="7" idx="0"/>
+            <a:endCxn id="4" idx="0"/>
           </p:cNvCxnSpPr>
           <p:nvPr/>
         </p:nvCxnSpPr>
         <p:spPr>
-          <a:xfrm flipH="1">
-            <a:off x="3476031" y="3919157"/>
-            <a:ext cx="1" cy="811069"/>
+          <a:xfrm>
+            <a:off x="3476032" y="3919157"/>
+            <a:ext cx="1074617" cy="811069"/>
           </a:xfrm>
           <a:prstGeom prst="straightConnector1">
             <a:avLst/>
@@ -4409,17 +4404,17 @@
       </p:cxnSp>
       <p:cxnSp>
         <p:nvCxnSpPr>
-          <p:cNvPr id="96" name="Straight Arrow Connector 95"/>
+          <p:cNvPr id="113" name="Straight Arrow Connector 112"/>
           <p:cNvCxnSpPr>
             <a:stCxn id="19" idx="2"/>
-            <a:endCxn id="4" idx="0"/>
+            <a:endCxn id="7" idx="0"/>
           </p:cNvCxnSpPr>
           <p:nvPr/>
         </p:nvCxnSpPr>
         <p:spPr>
-          <a:xfrm>
-            <a:off x="3476032" y="3919157"/>
-            <a:ext cx="1074617" cy="811069"/>
+          <a:xfrm flipH="1">
+            <a:off x="3476031" y="3919157"/>
+            <a:ext cx="1" cy="811069"/>
           </a:xfrm>
           <a:prstGeom prst="straightConnector1">
             <a:avLst/>
@@ -4428,6 +4423,7 @@
             <a:solidFill>
               <a:schemeClr val="tx1"/>
             </a:solidFill>
+            <a:headEnd type="triangle"/>
             <a:tailEnd type="triangle"/>
           </a:ln>
         </p:spPr>
@@ -4450,6 +4446,65 @@
     <p:extLst>
       <p:ext uri="{BB962C8B-B14F-4D97-AF65-F5344CB8AC3E}">
         <p14:creationId xmlns:p14="http://schemas.microsoft.com/office/powerpoint/2010/main" val="1713085849"/>
+      </p:ext>
+    </p:extLst>
+  </p:cSld>
+  <p:clrMapOvr>
+    <a:masterClrMapping/>
+  </p:clrMapOvr>
+</p:sld>
+</file>
+
+<file path=ppt/slides/slide2.xml><?xml version="1.0" encoding="utf-8"?>
+<p:sld xmlns:a="http://schemas.openxmlformats.org/drawingml/2006/main" xmlns:r="http://schemas.openxmlformats.org/officeDocument/2006/relationships" xmlns:p="http://schemas.openxmlformats.org/presentationml/2006/main">
+  <p:cSld>
+    <p:spTree>
+      <p:nvGrpSpPr>
+        <p:cNvPr id="1" name=""/>
+        <p:cNvGrpSpPr/>
+        <p:nvPr/>
+      </p:nvGrpSpPr>
+      <p:grpSpPr>
+        <a:xfrm>
+          <a:off x="0" y="0"/>
+          <a:ext cx="0" cy="0"/>
+          <a:chOff x="0" y="0"/>
+          <a:chExt cx="0" cy="0"/>
+        </a:xfrm>
+      </p:grpSpPr>
+      <p:pic>
+        <p:nvPicPr>
+          <p:cNvPr id="2" name="Picture 1"/>
+          <p:cNvPicPr>
+            <a:picLocks noChangeAspect="1"/>
+          </p:cNvPicPr>
+          <p:nvPr/>
+        </p:nvPicPr>
+        <p:blipFill rotWithShape="1">
+          <a:blip r:embed="rId2">
+            <a:extLst>
+              <a:ext uri="{28A0092B-C50C-407E-A947-70E740481C1C}">
+                <a14:useLocalDpi xmlns:a14="http://schemas.microsoft.com/office/drawing/2010/main" val="0"/>
+              </a:ext>
+            </a:extLst>
+          </a:blip>
+          <a:srcRect l="787" t="1518" r="1"/>
+          <a:stretch/>
+        </p:blipFill>
+        <p:spPr>
+          <a:xfrm>
+            <a:off x="4314825" y="2717800"/>
+            <a:ext cx="3606894" cy="1444662"/>
+          </a:xfrm>
+          <a:prstGeom prst="rect">
+            <a:avLst/>
+          </a:prstGeom>
+        </p:spPr>
+      </p:pic>
+    </p:spTree>
+    <p:extLst>
+      <p:ext uri="{BB962C8B-B14F-4D97-AF65-F5344CB8AC3E}">
+        <p14:creationId xmlns:p14="http://schemas.microsoft.com/office/powerpoint/2010/main" val="723011002"/>
       </p:ext>
     </p:extLst>
   </p:cSld>

</xml_diff>